<commit_message>
Fix typo, pdf update.
</commit_message>
<xml_diff>
--- a/C/04-functions.pptx
+++ b/C/04-functions.pptx
@@ -241,7 +241,7 @@
           <a:p>
             <a:fld id="{04DF920D-A594-444B-97CA-E94B817380A4}" type="datetimeFigureOut">
               <a:rPr lang="ko-KR" altLang="en-US" smtClean="0"/>
-              <a:t>2020-06-30</a:t>
+              <a:t>2020-07-01</a:t>
             </a:fld>
             <a:endParaRPr lang="ko-KR" altLang="en-US"/>
           </a:p>
@@ -418,7 +418,7 @@
           <a:p>
             <a:fld id="{6EC9B527-8C61-4FA9-B574-D8CAC3B4993F}" type="datetimeFigureOut">
               <a:rPr lang="ko-KR" altLang="en-US" smtClean="0"/>
-              <a:t>2020-06-30</a:t>
+              <a:t>2020-07-01</a:t>
             </a:fld>
             <a:endParaRPr lang="ko-KR" altLang="en-US"/>
           </a:p>
@@ -2734,11 +2734,15 @@
             </a:r>
             <a:r>
               <a:rPr lang="en-US" altLang="ko-KR" dirty="0"/>
-              <a:t>static method </a:t>
+              <a:t>function</a:t>
+            </a:r>
+            <a:r>
+              <a:rPr lang="ko-KR" altLang="en-US"/>
+              <a:t>을 </a:t>
             </a:r>
             <a:r>
               <a:rPr lang="ko-KR" altLang="en-US" dirty="0"/>
-              <a:t>를 사용할 것</a:t>
+              <a:t>사용할 것</a:t>
             </a:r>
           </a:p>
           <a:p>

</xml_diff>